<commit_message>
Implemented a Flanker task
</commit_message>
<xml_diff>
--- a/docs/stroop/images/images_da.pptx
+++ b/docs/stroop/images/images_da.pptx
@@ -1686,10 +1686,251 @@
       </p:grpSpPr>
       <p:sp>
         <p:nvSpPr>
-          <p:cNvPr id="3" name="TextBox 2">
+          <p:cNvPr id="2" name="Oval 1">
             <a:extLst>
               <a:ext uri="{FF2B5EF4-FFF2-40B4-BE49-F238E27FC236}">
-                <a16:creationId xmlns:a16="http://schemas.microsoft.com/office/drawing/2014/main" id="{84252593-E5E9-9E03-4345-BC6F4D9FE5A5}"/>
+                <a16:creationId xmlns:a16="http://schemas.microsoft.com/office/drawing/2014/main" id="{094DD278-2965-1526-9F37-33186856F1A0}"/>
+              </a:ext>
+            </a:extLst>
+          </p:cNvPr>
+          <p:cNvSpPr/>
+          <p:nvPr/>
+        </p:nvSpPr>
+        <p:spPr>
+          <a:xfrm>
+            <a:off x="5779702" y="1896493"/>
+            <a:ext cx="895547" cy="857839"/>
+          </a:xfrm>
+          <a:prstGeom prst="ellipse">
+            <a:avLst/>
+          </a:prstGeom>
+          <a:solidFill>
+            <a:srgbClr val="FF0000"/>
+          </a:solidFill>
+        </p:spPr>
+        <p:style>
+          <a:lnRef idx="2">
+            <a:schemeClr val="accent1">
+              <a:shade val="15000"/>
+            </a:schemeClr>
+          </a:lnRef>
+          <a:fillRef idx="1">
+            <a:schemeClr val="accent1"/>
+          </a:fillRef>
+          <a:effectRef idx="0">
+            <a:schemeClr val="accent1"/>
+          </a:effectRef>
+          <a:fontRef idx="minor">
+            <a:schemeClr val="lt1"/>
+          </a:fontRef>
+        </p:style>
+        <p:txBody>
+          <a:bodyPr rtlCol="0" anchor="ctr"/>
+          <a:lstStyle/>
+          <a:p>
+            <a:pPr algn="ctr"/>
+            <a:r>
+              <a:rPr lang="en-GB" sz="3200" dirty="0">
+                <a:solidFill>
+                  <a:schemeClr val="tx1"/>
+                </a:solidFill>
+              </a:rPr>
+              <a:t>1</a:t>
+            </a:r>
+            <a:endParaRPr lang="en-DK" dirty="0">
+              <a:solidFill>
+                <a:schemeClr val="tx1"/>
+              </a:solidFill>
+            </a:endParaRPr>
+          </a:p>
+        </p:txBody>
+      </p:sp>
+      <p:sp>
+        <p:nvSpPr>
+          <p:cNvPr id="4" name="Oval 3">
+            <a:extLst>
+              <a:ext uri="{FF2B5EF4-FFF2-40B4-BE49-F238E27FC236}">
+                <a16:creationId xmlns:a16="http://schemas.microsoft.com/office/drawing/2014/main" id="{F2F03731-E62A-2C9F-86FE-DFA60415118F}"/>
+              </a:ext>
+            </a:extLst>
+          </p:cNvPr>
+          <p:cNvSpPr/>
+          <p:nvPr/>
+        </p:nvSpPr>
+        <p:spPr>
+          <a:xfrm>
+            <a:off x="6675249" y="3000079"/>
+            <a:ext cx="895547" cy="857839"/>
+          </a:xfrm>
+          <a:prstGeom prst="ellipse">
+            <a:avLst/>
+          </a:prstGeom>
+          <a:solidFill>
+            <a:srgbClr val="00B050"/>
+          </a:solidFill>
+        </p:spPr>
+        <p:style>
+          <a:lnRef idx="2">
+            <a:schemeClr val="accent1">
+              <a:shade val="15000"/>
+            </a:schemeClr>
+          </a:lnRef>
+          <a:fillRef idx="1">
+            <a:schemeClr val="accent1"/>
+          </a:fillRef>
+          <a:effectRef idx="0">
+            <a:schemeClr val="accent1"/>
+          </a:effectRef>
+          <a:fontRef idx="minor">
+            <a:schemeClr val="lt1"/>
+          </a:fontRef>
+        </p:style>
+        <p:txBody>
+          <a:bodyPr rtlCol="0" anchor="ctr"/>
+          <a:lstStyle/>
+          <a:p>
+            <a:pPr algn="ctr"/>
+            <a:r>
+              <a:rPr lang="en-GB" sz="3200" dirty="0">
+                <a:solidFill>
+                  <a:schemeClr val="tx1"/>
+                </a:solidFill>
+              </a:rPr>
+              <a:t>2</a:t>
+            </a:r>
+            <a:endParaRPr lang="en-DK" dirty="0">
+              <a:solidFill>
+                <a:schemeClr val="tx1"/>
+              </a:solidFill>
+            </a:endParaRPr>
+          </a:p>
+        </p:txBody>
+      </p:sp>
+      <p:sp>
+        <p:nvSpPr>
+          <p:cNvPr id="5" name="Oval 4">
+            <a:extLst>
+              <a:ext uri="{FF2B5EF4-FFF2-40B4-BE49-F238E27FC236}">
+                <a16:creationId xmlns:a16="http://schemas.microsoft.com/office/drawing/2014/main" id="{D1C7E454-1099-E4CF-3C2A-8AF3FECB2EA2}"/>
+              </a:ext>
+            </a:extLst>
+          </p:cNvPr>
+          <p:cNvSpPr/>
+          <p:nvPr/>
+        </p:nvSpPr>
+        <p:spPr>
+          <a:xfrm>
+            <a:off x="5779702" y="4034669"/>
+            <a:ext cx="895547" cy="857839"/>
+          </a:xfrm>
+          <a:prstGeom prst="ellipse">
+            <a:avLst/>
+          </a:prstGeom>
+        </p:spPr>
+        <p:style>
+          <a:lnRef idx="2">
+            <a:schemeClr val="accent1">
+              <a:shade val="15000"/>
+            </a:schemeClr>
+          </a:lnRef>
+          <a:fillRef idx="1">
+            <a:schemeClr val="accent1"/>
+          </a:fillRef>
+          <a:effectRef idx="0">
+            <a:schemeClr val="accent1"/>
+          </a:effectRef>
+          <a:fontRef idx="minor">
+            <a:schemeClr val="lt1"/>
+          </a:fontRef>
+        </p:style>
+        <p:txBody>
+          <a:bodyPr rtlCol="0" anchor="ctr"/>
+          <a:lstStyle/>
+          <a:p>
+            <a:pPr algn="ctr"/>
+            <a:r>
+              <a:rPr lang="en-GB" sz="3200" dirty="0">
+                <a:solidFill>
+                  <a:schemeClr val="tx1"/>
+                </a:solidFill>
+              </a:rPr>
+              <a:t>3</a:t>
+            </a:r>
+            <a:endParaRPr lang="en-DK" dirty="0">
+              <a:solidFill>
+                <a:schemeClr val="tx1"/>
+              </a:solidFill>
+            </a:endParaRPr>
+          </a:p>
+        </p:txBody>
+      </p:sp>
+      <p:sp>
+        <p:nvSpPr>
+          <p:cNvPr id="6" name="Oval 5">
+            <a:extLst>
+              <a:ext uri="{FF2B5EF4-FFF2-40B4-BE49-F238E27FC236}">
+                <a16:creationId xmlns:a16="http://schemas.microsoft.com/office/drawing/2014/main" id="{8D8E946D-B368-EB65-960E-E165183BFC81}"/>
+              </a:ext>
+            </a:extLst>
+          </p:cNvPr>
+          <p:cNvSpPr/>
+          <p:nvPr/>
+        </p:nvSpPr>
+        <p:spPr>
+          <a:xfrm>
+            <a:off x="4825185" y="3000079"/>
+            <a:ext cx="895547" cy="857839"/>
+          </a:xfrm>
+          <a:prstGeom prst="ellipse">
+            <a:avLst/>
+          </a:prstGeom>
+          <a:solidFill>
+            <a:srgbClr val="FFFF00"/>
+          </a:solidFill>
+        </p:spPr>
+        <p:style>
+          <a:lnRef idx="2">
+            <a:schemeClr val="accent1">
+              <a:shade val="15000"/>
+            </a:schemeClr>
+          </a:lnRef>
+          <a:fillRef idx="1">
+            <a:schemeClr val="accent1"/>
+          </a:fillRef>
+          <a:effectRef idx="0">
+            <a:schemeClr val="accent1"/>
+          </a:effectRef>
+          <a:fontRef idx="minor">
+            <a:schemeClr val="lt1"/>
+          </a:fontRef>
+        </p:style>
+        <p:txBody>
+          <a:bodyPr rtlCol="0" anchor="ctr"/>
+          <a:lstStyle/>
+          <a:p>
+            <a:pPr algn="ctr"/>
+            <a:r>
+              <a:rPr lang="en-GB" sz="3200" dirty="0">
+                <a:solidFill>
+                  <a:schemeClr val="bg1"/>
+                </a:solidFill>
+              </a:rPr>
+              <a:t>4</a:t>
+            </a:r>
+            <a:endParaRPr lang="en-DK" dirty="0">
+              <a:solidFill>
+                <a:schemeClr val="bg1"/>
+              </a:solidFill>
+            </a:endParaRPr>
+          </a:p>
+        </p:txBody>
+      </p:sp>
+      <p:sp>
+        <p:nvSpPr>
+          <p:cNvPr id="7" name="TextBox 6">
+            <a:extLst>
+              <a:ext uri="{FF2B5EF4-FFF2-40B4-BE49-F238E27FC236}">
+                <a16:creationId xmlns:a16="http://schemas.microsoft.com/office/drawing/2014/main" id="{979ABCD8-629F-B122-B15E-CAFB8A6B7A79}"/>
               </a:ext>
             </a:extLst>
           </p:cNvPr>
@@ -1698,8 +1939,8 @@
         </p:nvSpPr>
         <p:spPr>
           <a:xfrm>
-            <a:off x="4328368" y="3244334"/>
-            <a:ext cx="3535263" cy="369332"/>
+            <a:off x="1660338" y="563427"/>
+            <a:ext cx="9322189" cy="830997"/>
           </a:xfrm>
           <a:prstGeom prst="rect">
             <a:avLst/>
@@ -1707,20 +1948,145 @@
           <a:noFill/>
         </p:spPr>
         <p:txBody>
-          <a:bodyPr wrap="none" rtlCol="0">
+          <a:bodyPr wrap="square" rtlCol="0">
             <a:spAutoFit/>
           </a:bodyPr>
           <a:lstStyle/>
           <a:p>
-            <a:r>
-              <a:rPr lang="en-GB" dirty="0" err="1"/>
-              <a:t>Instruktioner</a:t>
-            </a:r>
-            <a:r>
-              <a:rPr lang="en-GB" dirty="0"/>
-              <a:t> for neutral Stroop test</a:t>
-            </a:r>
-            <a:endParaRPr lang="en-DK" dirty="0"/>
+            <a:pPr algn="ctr"/>
+            <a:r>
+              <a:rPr lang="en-GB" sz="2400" dirty="0"/>
+              <a:t>Du se </a:t>
+            </a:r>
+            <a:r>
+              <a:rPr lang="en-GB" sz="2400" dirty="0" err="1"/>
+              <a:t>en</a:t>
+            </a:r>
+            <a:r>
+              <a:rPr lang="en-GB" sz="2400" dirty="0"/>
+              <a:t> </a:t>
+            </a:r>
+            <a:r>
+              <a:rPr lang="en-GB" sz="2400" dirty="0" err="1"/>
+              <a:t>række</a:t>
+            </a:r>
+            <a:r>
+              <a:rPr lang="en-GB" sz="2400" dirty="0"/>
+              <a:t> </a:t>
+            </a:r>
+            <a:r>
+              <a:rPr lang="en-GB" sz="2400" dirty="0" err="1"/>
+              <a:t>af</a:t>
+            </a:r>
+            <a:r>
+              <a:rPr lang="en-GB" sz="2400" dirty="0"/>
+              <a:t> </a:t>
+            </a:r>
+            <a:r>
+              <a:rPr lang="en-GB" sz="2400" dirty="0" err="1"/>
+              <a:t>firkanter</a:t>
+            </a:r>
+            <a:r>
+              <a:rPr lang="en-GB" sz="2400" dirty="0"/>
+              <a:t> </a:t>
+            </a:r>
+            <a:r>
+              <a:rPr lang="en-GB" sz="2400" dirty="0" err="1"/>
+              <a:t>som</a:t>
+            </a:r>
+            <a:r>
+              <a:rPr lang="en-GB" sz="2400" dirty="0"/>
+              <a:t> er </a:t>
+            </a:r>
+            <a:r>
+              <a:rPr lang="en-GB" sz="2400" dirty="0" err="1"/>
+              <a:t>røde</a:t>
+            </a:r>
+            <a:r>
+              <a:rPr lang="en-GB" sz="2400" dirty="0"/>
+              <a:t>, </a:t>
+            </a:r>
+            <a:r>
+              <a:rPr lang="en-GB" sz="2400" dirty="0" err="1"/>
+              <a:t>grønne</a:t>
+            </a:r>
+            <a:r>
+              <a:rPr lang="en-GB" sz="2400" dirty="0"/>
+              <a:t>, </a:t>
+            </a:r>
+            <a:r>
+              <a:rPr lang="en-GB" sz="2400" dirty="0" err="1"/>
+              <a:t>blå</a:t>
+            </a:r>
+            <a:r>
+              <a:rPr lang="en-GB" sz="2400" dirty="0"/>
+              <a:t> </a:t>
+            </a:r>
+            <a:r>
+              <a:rPr lang="en-GB" sz="2400" dirty="0" err="1"/>
+              <a:t>eller</a:t>
+            </a:r>
+            <a:r>
+              <a:rPr lang="en-GB" sz="2400" dirty="0"/>
+              <a:t> </a:t>
+            </a:r>
+            <a:r>
+              <a:rPr lang="en-GB" sz="2400" dirty="0" err="1"/>
+              <a:t>gule</a:t>
+            </a:r>
+            <a:r>
+              <a:rPr lang="en-GB" sz="2400" dirty="0"/>
+              <a:t>. Press den knap </a:t>
+            </a:r>
+            <a:r>
+              <a:rPr lang="en-GB" sz="2400" dirty="0" err="1"/>
+              <a:t>som</a:t>
+            </a:r>
+            <a:r>
+              <a:rPr lang="en-GB" sz="2400" dirty="0"/>
+              <a:t> </a:t>
+            </a:r>
+            <a:r>
+              <a:rPr lang="en-GB" sz="2400" dirty="0" err="1"/>
+              <a:t>svarer</a:t>
+            </a:r>
+            <a:r>
+              <a:rPr lang="en-GB" sz="2400" dirty="0"/>
+              <a:t> </a:t>
+            </a:r>
+            <a:r>
+              <a:rPr lang="en-GB" sz="2400" dirty="0" err="1"/>
+              <a:t>til</a:t>
+            </a:r>
+            <a:r>
+              <a:rPr lang="en-GB" sz="2400" dirty="0"/>
+              <a:t> </a:t>
+            </a:r>
+            <a:r>
+              <a:rPr lang="en-GB" sz="2400" dirty="0" err="1"/>
+              <a:t>farven</a:t>
+            </a:r>
+            <a:r>
+              <a:rPr lang="en-GB" sz="2400" dirty="0"/>
+              <a:t> </a:t>
+            </a:r>
+            <a:r>
+              <a:rPr lang="en-GB" sz="2400" dirty="0" err="1"/>
+              <a:t>på</a:t>
+            </a:r>
+            <a:r>
+              <a:rPr lang="en-GB" sz="2400" dirty="0"/>
+              <a:t> </a:t>
+            </a:r>
+            <a:r>
+              <a:rPr lang="en-GB" sz="2400" dirty="0" err="1"/>
+              <a:t>firkanten</a:t>
+            </a:r>
+            <a:r>
+              <a:rPr lang="en-GB" sz="2400" dirty="0"/>
+              <a:t>.</a:t>
+            </a:r>
+            <a:endParaRPr lang="en-DK" sz="2400" dirty="0"/>
           </a:p>
         </p:txBody>
       </p:sp>
@@ -1756,10 +2122,251 @@
       </p:grpSpPr>
       <p:sp>
         <p:nvSpPr>
-          <p:cNvPr id="3" name="TextBox 2">
+          <p:cNvPr id="2" name="Oval 1">
             <a:extLst>
               <a:ext uri="{FF2B5EF4-FFF2-40B4-BE49-F238E27FC236}">
-                <a16:creationId xmlns:a16="http://schemas.microsoft.com/office/drawing/2014/main" id="{84252593-E5E9-9E03-4345-BC6F4D9FE5A5}"/>
+                <a16:creationId xmlns:a16="http://schemas.microsoft.com/office/drawing/2014/main" id="{5AACD825-95EF-5385-4A07-2CB81C1B6115}"/>
+              </a:ext>
+            </a:extLst>
+          </p:cNvPr>
+          <p:cNvSpPr/>
+          <p:nvPr/>
+        </p:nvSpPr>
+        <p:spPr>
+          <a:xfrm>
+            <a:off x="5779702" y="1896493"/>
+            <a:ext cx="895547" cy="857839"/>
+          </a:xfrm>
+          <a:prstGeom prst="ellipse">
+            <a:avLst/>
+          </a:prstGeom>
+          <a:solidFill>
+            <a:srgbClr val="FF0000"/>
+          </a:solidFill>
+        </p:spPr>
+        <p:style>
+          <a:lnRef idx="2">
+            <a:schemeClr val="accent1">
+              <a:shade val="15000"/>
+            </a:schemeClr>
+          </a:lnRef>
+          <a:fillRef idx="1">
+            <a:schemeClr val="accent1"/>
+          </a:fillRef>
+          <a:effectRef idx="0">
+            <a:schemeClr val="accent1"/>
+          </a:effectRef>
+          <a:fontRef idx="minor">
+            <a:schemeClr val="lt1"/>
+          </a:fontRef>
+        </p:style>
+        <p:txBody>
+          <a:bodyPr rtlCol="0" anchor="ctr"/>
+          <a:lstStyle/>
+          <a:p>
+            <a:pPr algn="ctr"/>
+            <a:r>
+              <a:rPr lang="en-GB" sz="3200" dirty="0">
+                <a:solidFill>
+                  <a:schemeClr val="tx1"/>
+                </a:solidFill>
+              </a:rPr>
+              <a:t>1</a:t>
+            </a:r>
+            <a:endParaRPr lang="en-DK" dirty="0">
+              <a:solidFill>
+                <a:schemeClr val="tx1"/>
+              </a:solidFill>
+            </a:endParaRPr>
+          </a:p>
+        </p:txBody>
+      </p:sp>
+      <p:sp>
+        <p:nvSpPr>
+          <p:cNvPr id="4" name="Oval 3">
+            <a:extLst>
+              <a:ext uri="{FF2B5EF4-FFF2-40B4-BE49-F238E27FC236}">
+                <a16:creationId xmlns:a16="http://schemas.microsoft.com/office/drawing/2014/main" id="{A428E9B3-2760-F44D-523F-1FCF9E637044}"/>
+              </a:ext>
+            </a:extLst>
+          </p:cNvPr>
+          <p:cNvSpPr/>
+          <p:nvPr/>
+        </p:nvSpPr>
+        <p:spPr>
+          <a:xfrm>
+            <a:off x="6675249" y="3000079"/>
+            <a:ext cx="895547" cy="857839"/>
+          </a:xfrm>
+          <a:prstGeom prst="ellipse">
+            <a:avLst/>
+          </a:prstGeom>
+          <a:solidFill>
+            <a:srgbClr val="00B050"/>
+          </a:solidFill>
+        </p:spPr>
+        <p:style>
+          <a:lnRef idx="2">
+            <a:schemeClr val="accent1">
+              <a:shade val="15000"/>
+            </a:schemeClr>
+          </a:lnRef>
+          <a:fillRef idx="1">
+            <a:schemeClr val="accent1"/>
+          </a:fillRef>
+          <a:effectRef idx="0">
+            <a:schemeClr val="accent1"/>
+          </a:effectRef>
+          <a:fontRef idx="minor">
+            <a:schemeClr val="lt1"/>
+          </a:fontRef>
+        </p:style>
+        <p:txBody>
+          <a:bodyPr rtlCol="0" anchor="ctr"/>
+          <a:lstStyle/>
+          <a:p>
+            <a:pPr algn="ctr"/>
+            <a:r>
+              <a:rPr lang="en-GB" sz="3200" dirty="0">
+                <a:solidFill>
+                  <a:schemeClr val="tx1"/>
+                </a:solidFill>
+              </a:rPr>
+              <a:t>2</a:t>
+            </a:r>
+            <a:endParaRPr lang="en-DK" dirty="0">
+              <a:solidFill>
+                <a:schemeClr val="tx1"/>
+              </a:solidFill>
+            </a:endParaRPr>
+          </a:p>
+        </p:txBody>
+      </p:sp>
+      <p:sp>
+        <p:nvSpPr>
+          <p:cNvPr id="5" name="Oval 4">
+            <a:extLst>
+              <a:ext uri="{FF2B5EF4-FFF2-40B4-BE49-F238E27FC236}">
+                <a16:creationId xmlns:a16="http://schemas.microsoft.com/office/drawing/2014/main" id="{A11ABE34-3A5D-5498-E517-5E81FDCBBC42}"/>
+              </a:ext>
+            </a:extLst>
+          </p:cNvPr>
+          <p:cNvSpPr/>
+          <p:nvPr/>
+        </p:nvSpPr>
+        <p:spPr>
+          <a:xfrm>
+            <a:off x="5779702" y="4034669"/>
+            <a:ext cx="895547" cy="857839"/>
+          </a:xfrm>
+          <a:prstGeom prst="ellipse">
+            <a:avLst/>
+          </a:prstGeom>
+        </p:spPr>
+        <p:style>
+          <a:lnRef idx="2">
+            <a:schemeClr val="accent1">
+              <a:shade val="15000"/>
+            </a:schemeClr>
+          </a:lnRef>
+          <a:fillRef idx="1">
+            <a:schemeClr val="accent1"/>
+          </a:fillRef>
+          <a:effectRef idx="0">
+            <a:schemeClr val="accent1"/>
+          </a:effectRef>
+          <a:fontRef idx="minor">
+            <a:schemeClr val="lt1"/>
+          </a:fontRef>
+        </p:style>
+        <p:txBody>
+          <a:bodyPr rtlCol="0" anchor="ctr"/>
+          <a:lstStyle/>
+          <a:p>
+            <a:pPr algn="ctr"/>
+            <a:r>
+              <a:rPr lang="en-GB" sz="3200" dirty="0">
+                <a:solidFill>
+                  <a:schemeClr val="tx1"/>
+                </a:solidFill>
+              </a:rPr>
+              <a:t>3</a:t>
+            </a:r>
+            <a:endParaRPr lang="en-DK" dirty="0">
+              <a:solidFill>
+                <a:schemeClr val="tx1"/>
+              </a:solidFill>
+            </a:endParaRPr>
+          </a:p>
+        </p:txBody>
+      </p:sp>
+      <p:sp>
+        <p:nvSpPr>
+          <p:cNvPr id="6" name="Oval 5">
+            <a:extLst>
+              <a:ext uri="{FF2B5EF4-FFF2-40B4-BE49-F238E27FC236}">
+                <a16:creationId xmlns:a16="http://schemas.microsoft.com/office/drawing/2014/main" id="{5196E3B7-AC94-73C3-E2D1-400455E0ED7C}"/>
+              </a:ext>
+            </a:extLst>
+          </p:cNvPr>
+          <p:cNvSpPr/>
+          <p:nvPr/>
+        </p:nvSpPr>
+        <p:spPr>
+          <a:xfrm>
+            <a:off x="4825185" y="3000079"/>
+            <a:ext cx="895547" cy="857839"/>
+          </a:xfrm>
+          <a:prstGeom prst="ellipse">
+            <a:avLst/>
+          </a:prstGeom>
+          <a:solidFill>
+            <a:srgbClr val="FFFF00"/>
+          </a:solidFill>
+        </p:spPr>
+        <p:style>
+          <a:lnRef idx="2">
+            <a:schemeClr val="accent1">
+              <a:shade val="15000"/>
+            </a:schemeClr>
+          </a:lnRef>
+          <a:fillRef idx="1">
+            <a:schemeClr val="accent1"/>
+          </a:fillRef>
+          <a:effectRef idx="0">
+            <a:schemeClr val="accent1"/>
+          </a:effectRef>
+          <a:fontRef idx="minor">
+            <a:schemeClr val="lt1"/>
+          </a:fontRef>
+        </p:style>
+        <p:txBody>
+          <a:bodyPr rtlCol="0" anchor="ctr"/>
+          <a:lstStyle/>
+          <a:p>
+            <a:pPr algn="ctr"/>
+            <a:r>
+              <a:rPr lang="en-GB" sz="3200" dirty="0">
+                <a:solidFill>
+                  <a:schemeClr val="bg1"/>
+                </a:solidFill>
+              </a:rPr>
+              <a:t>4</a:t>
+            </a:r>
+            <a:endParaRPr lang="en-DK" dirty="0">
+              <a:solidFill>
+                <a:schemeClr val="bg1"/>
+              </a:solidFill>
+            </a:endParaRPr>
+          </a:p>
+        </p:txBody>
+      </p:sp>
+      <p:sp>
+        <p:nvSpPr>
+          <p:cNvPr id="7" name="TextBox 6">
+            <a:extLst>
+              <a:ext uri="{FF2B5EF4-FFF2-40B4-BE49-F238E27FC236}">
+                <a16:creationId xmlns:a16="http://schemas.microsoft.com/office/drawing/2014/main" id="{192E3CB2-BA45-4D16-7FF5-23D343D5D117}"/>
               </a:ext>
             </a:extLst>
           </p:cNvPr>
@@ -1768,8 +2375,8 @@
         </p:nvSpPr>
         <p:spPr>
           <a:xfrm>
-            <a:off x="5397411" y="3244334"/>
-            <a:ext cx="1397177" cy="369332"/>
+            <a:off x="1660339" y="563427"/>
+            <a:ext cx="9134272" cy="830997"/>
           </a:xfrm>
           <a:prstGeom prst="rect">
             <a:avLst/>
@@ -1777,16 +2384,185 @@
           <a:noFill/>
         </p:spPr>
         <p:txBody>
-          <a:bodyPr wrap="none" rtlCol="0">
+          <a:bodyPr wrap="square" rtlCol="0">
             <a:spAutoFit/>
           </a:bodyPr>
           <a:lstStyle/>
           <a:p>
-            <a:r>
-              <a:rPr lang="en-GB" dirty="0" err="1"/>
-              <a:t>Instructioner</a:t>
-            </a:r>
-            <a:endParaRPr lang="en-DK" dirty="0"/>
+            <a:pPr algn="ctr"/>
+            <a:r>
+              <a:rPr lang="en-GB" sz="2400" dirty="0"/>
+              <a:t>Du </a:t>
+            </a:r>
+            <a:r>
+              <a:rPr lang="en-GB" sz="2400" dirty="0" err="1"/>
+              <a:t>vil</a:t>
+            </a:r>
+            <a:r>
+              <a:rPr lang="en-GB" sz="2400" dirty="0"/>
+              <a:t> se </a:t>
+            </a:r>
+            <a:r>
+              <a:rPr lang="en-GB" sz="2400" dirty="0" err="1"/>
+              <a:t>en</a:t>
+            </a:r>
+            <a:r>
+              <a:rPr lang="en-GB" sz="2400" dirty="0"/>
+              <a:t> </a:t>
+            </a:r>
+            <a:r>
+              <a:rPr lang="en-GB" sz="2400" dirty="0" err="1"/>
+              <a:t>række</a:t>
+            </a:r>
+            <a:r>
+              <a:rPr lang="en-GB" sz="2400" dirty="0"/>
+              <a:t> </a:t>
+            </a:r>
+            <a:r>
+              <a:rPr lang="en-GB" sz="2400" dirty="0" err="1"/>
+              <a:t>af</a:t>
+            </a:r>
+            <a:r>
+              <a:rPr lang="en-GB" sz="2400" dirty="0"/>
+              <a:t> </a:t>
+            </a:r>
+            <a:r>
+              <a:rPr lang="en-GB" sz="2400" dirty="0" err="1"/>
+              <a:t>ord</a:t>
+            </a:r>
+            <a:r>
+              <a:rPr lang="en-GB" sz="2400" dirty="0"/>
+              <a:t> </a:t>
+            </a:r>
+            <a:r>
+              <a:rPr lang="en-GB" sz="2400" dirty="0" err="1"/>
+              <a:t>som</a:t>
+            </a:r>
+            <a:r>
+              <a:rPr lang="en-GB" sz="2400" dirty="0"/>
+              <a:t> er </a:t>
+            </a:r>
+            <a:r>
+              <a:rPr lang="en-GB" sz="2400" dirty="0" err="1"/>
+              <a:t>skrevet</a:t>
+            </a:r>
+            <a:r>
+              <a:rPr lang="en-GB" sz="2400" dirty="0"/>
+              <a:t> med </a:t>
+            </a:r>
+            <a:r>
+              <a:rPr lang="en-GB" sz="2400" dirty="0" err="1"/>
+              <a:t>rød</a:t>
+            </a:r>
+            <a:r>
+              <a:rPr lang="en-GB" sz="2400" dirty="0"/>
+              <a:t>, </a:t>
+            </a:r>
+            <a:r>
+              <a:rPr lang="en-GB" sz="2400" dirty="0" err="1"/>
+              <a:t>grøn</a:t>
+            </a:r>
+            <a:r>
+              <a:rPr lang="en-GB" sz="2400" dirty="0"/>
+              <a:t>, </a:t>
+            </a:r>
+            <a:r>
+              <a:rPr lang="en-GB" sz="2400" dirty="0" err="1"/>
+              <a:t>blå</a:t>
+            </a:r>
+            <a:r>
+              <a:rPr lang="en-GB" sz="2400" dirty="0"/>
+              <a:t> </a:t>
+            </a:r>
+            <a:r>
+              <a:rPr lang="en-GB" sz="2400" dirty="0" err="1"/>
+              <a:t>eller</a:t>
+            </a:r>
+            <a:r>
+              <a:rPr lang="en-GB" sz="2400" dirty="0"/>
+              <a:t> </a:t>
+            </a:r>
+            <a:r>
+              <a:rPr lang="en-GB" sz="2400" dirty="0" err="1"/>
+              <a:t>rød</a:t>
+            </a:r>
+            <a:r>
+              <a:rPr lang="en-GB" sz="2400" dirty="0"/>
+              <a:t> </a:t>
+            </a:r>
+            <a:r>
+              <a:rPr lang="en-GB" sz="2400" dirty="0" err="1"/>
+              <a:t>tekst</a:t>
+            </a:r>
+            <a:r>
+              <a:rPr lang="en-GB" sz="2400" dirty="0"/>
+              <a:t>. Press den knap </a:t>
+            </a:r>
+            <a:r>
+              <a:rPr lang="en-GB" sz="2400" dirty="0" err="1"/>
+              <a:t>som</a:t>
+            </a:r>
+            <a:r>
+              <a:rPr lang="en-GB" sz="2400" dirty="0"/>
+              <a:t> </a:t>
+            </a:r>
+            <a:r>
+              <a:rPr lang="en-GB" sz="2400" dirty="0" err="1"/>
+              <a:t>svarer</a:t>
+            </a:r>
+            <a:r>
+              <a:rPr lang="en-GB" sz="2400" dirty="0"/>
+              <a:t> </a:t>
+            </a:r>
+            <a:r>
+              <a:rPr lang="en-GB" sz="2400" dirty="0" err="1"/>
+              <a:t>til</a:t>
+            </a:r>
+            <a:r>
+              <a:rPr lang="en-GB" sz="2400" dirty="0"/>
+              <a:t> </a:t>
+            </a:r>
+            <a:r>
+              <a:rPr lang="en-GB" sz="2400" dirty="0" err="1"/>
+              <a:t>farven</a:t>
+            </a:r>
+            <a:r>
+              <a:rPr lang="en-GB" sz="2400" dirty="0"/>
+              <a:t> </a:t>
+            </a:r>
+            <a:r>
+              <a:rPr lang="en-GB" sz="2400" dirty="0" err="1"/>
+              <a:t>som</a:t>
+            </a:r>
+            <a:r>
+              <a:rPr lang="en-GB" sz="2400" dirty="0"/>
+              <a:t> </a:t>
+            </a:r>
+            <a:r>
+              <a:rPr lang="en-GB" sz="2400" dirty="0" err="1"/>
+              <a:t>ordet</a:t>
+            </a:r>
+            <a:r>
+              <a:rPr lang="en-GB" sz="2400" dirty="0"/>
+              <a:t> er </a:t>
+            </a:r>
+            <a:r>
+              <a:rPr lang="en-GB" sz="2400" dirty="0" err="1"/>
+              <a:t>skrevet</a:t>
+            </a:r>
+            <a:r>
+              <a:rPr lang="en-GB" sz="2400" dirty="0"/>
+              <a:t> </a:t>
+            </a:r>
+            <a:r>
+              <a:rPr lang="en-GB" sz="2400" dirty="0" err="1"/>
+              <a:t>i</a:t>
+            </a:r>
+            <a:r>
+              <a:rPr lang="en-GB" sz="2400" dirty="0"/>
+              <a:t>.</a:t>
+            </a:r>
+            <a:endParaRPr lang="en-DK" sz="2400" dirty="0"/>
           </a:p>
         </p:txBody>
       </p:sp>

</xml_diff>